<commit_message>
Added Hands On Demos - Day 7.
</commit_message>
<xml_diff>
--- a/1. Core Java 8/Day 8/1. Input and Output with Streams and Files/Slides/1. Input and Output with Streams and Files/input-and-output-with-streams-and-files-slides.pptx
+++ b/1. Core Java 8/Day 8/1. Input and Output with Streams and Files/Slides/1. Input and Output with Streams and Files/input-and-output-with-streams-and-files-slides.pptx
@@ -20294,7 +20294,7 @@
         </p:blipFill>
         <p:spPr>
           <a:xfrm>
-            <a:off x="4879594" y="1762328"/>
+            <a:off x="5536184" y="1371803"/>
             <a:ext cx="1119924" cy="366064"/>
           </a:xfrm>
           <a:prstGeom prst="rect">
@@ -31512,9 +31512,9 @@
         <p:grpSpPr>
           <a:xfrm>
             <a:off x="1422527" y="2484740"/>
-            <a:ext cx="1945639" cy="1657350"/>
+            <a:ext cx="1945183" cy="2027570"/>
             <a:chOff x="1422527" y="2484740"/>
-            <a:chExt cx="1945639" cy="1657350"/>
+            <a:chExt cx="1945183" cy="2027570"/>
           </a:xfrm>
         </p:grpSpPr>
         <p:pic>
@@ -31610,7 +31610,7 @@
           </p:blipFill>
           <p:spPr>
             <a:xfrm>
-              <a:off x="1422527" y="3750310"/>
+              <a:off x="1422527" y="4207510"/>
               <a:ext cx="1466469" cy="304800"/>
             </a:xfrm>
             <a:prstGeom prst="rect">

</xml_diff>